<commit_message>
melee now linked to my fork on clojars
</commit_message>
<xml_diff>
--- a/doc/2018-06-07 Messaging ohne Middleware.pptx
+++ b/doc/2018-06-07 Messaging ohne Middleware.pptx
@@ -5,10 +5,10 @@
     <p:sldMasterId id="2147483660" r:id="rId5"/>
   </p:sldMasterIdLst>
   <p:notesMasterIdLst>
-    <p:notesMasterId r:id="rId22"/>
+    <p:notesMasterId r:id="rId23"/>
   </p:notesMasterIdLst>
   <p:handoutMasterIdLst>
-    <p:handoutMasterId r:id="rId23"/>
+    <p:handoutMasterId r:id="rId24"/>
   </p:handoutMasterIdLst>
   <p:sldIdLst>
     <p:sldId id="256" r:id="rId6"/>
@@ -27,11 +27,12 @@
     <p:sldId id="266" r:id="rId19"/>
     <p:sldId id="275" r:id="rId20"/>
     <p:sldId id="272" r:id="rId21"/>
+    <p:sldId id="276" r:id="rId22"/>
   </p:sldIdLst>
   <p:sldSz cx="12192000" cy="6858000"/>
   <p:notesSz cx="6858000" cy="9144000"/>
   <p:custDataLst>
-    <p:tags r:id="rId24"/>
+    <p:tags r:id="rId25"/>
   </p:custDataLst>
   <p:defaultTextStyle>
     <a:defPPr>
@@ -384,7 +385,7 @@
             <a:fld id="{24523C93-84C8-404C-9343-A87C958A5467}" type="datetimeFigureOut">
               <a:rPr lang="de-DE" smtClean="0"/>
               <a:pPr/>
-              <a:t>04.06.2018</a:t>
+              <a:t>09.06.2018</a:t>
             </a:fld>
             <a:endParaRPr lang="de-DE" dirty="0"/>
           </a:p>
@@ -798,7 +799,7 @@
             <a:fld id="{24523C93-84C8-404C-9343-A87C958A5467}" type="datetimeFigureOut">
               <a:rPr lang="de-DE" smtClean="0"/>
               <a:pPr/>
-              <a:t>04.06.2018</a:t>
+              <a:t>09.06.2018</a:t>
             </a:fld>
             <a:endParaRPr lang="de-DE" dirty="0"/>
           </a:p>
@@ -1173,7 +1174,7 @@
           <a:p>
             <a:fld id="{A2EF9E5F-3E99-4518-8063-5CD62F2A6982}" type="datetime1">
               <a:rPr lang="de-DE" smtClean="0"/>
-              <a:t>04.06.2018</a:t>
+              <a:t>09.06.2018</a:t>
             </a:fld>
             <a:endParaRPr lang="de-DE" dirty="0"/>
           </a:p>
@@ -1306,7 +1307,7 @@
             <a:fld id="{A52889C9-2E37-46FD-9AE7-6AD1A01DBAD7}" type="datetime1">
               <a:rPr lang="de-DE" smtClean="0"/>
               <a:pPr/>
-              <a:t>04.06.2018</a:t>
+              <a:t>09.06.2018</a:t>
             </a:fld>
             <a:endParaRPr lang="de-DE" dirty="0"/>
           </a:p>
@@ -1410,7 +1411,7 @@
           <a:graphicData uri="http://schemas.openxmlformats.org/presentationml/2006/ole">
             <mc:AlternateContent xmlns:mc="http://schemas.openxmlformats.org/markup-compatibility/2006">
               <mc:Choice xmlns:v="urn:schemas-microsoft-com:vml" Requires="v">
-                <p:oleObj spid="_x0000_s2128" name="think-cell Folie" r:id="rId7" imgW="270" imgH="270" progId="TCLayout.ActiveDocument.1">
+                <p:oleObj spid="_x0000_s2134" name="think-cell Folie" r:id="rId7" imgW="270" imgH="270" progId="TCLayout.ActiveDocument.1">
                   <p:embed/>
                 </p:oleObj>
               </mc:Choice>
@@ -2373,7 +2374,7 @@
             <a:fld id="{207F274F-E4AE-45D1-8462-735FF203E3CB}" type="datetime1">
               <a:rPr lang="de-DE" smtClean="0"/>
               <a:pPr/>
-              <a:t>04.06.2018</a:t>
+              <a:t>09.06.2018</a:t>
             </a:fld>
             <a:endParaRPr lang="de-DE" dirty="0"/>
           </a:p>
@@ -2787,7 +2788,7 @@
             <a:fld id="{207F274F-E4AE-45D1-8462-735FF203E3CB}" type="datetime1">
               <a:rPr lang="de-DE" smtClean="0"/>
               <a:pPr/>
-              <a:t>04.06.2018</a:t>
+              <a:t>09.06.2018</a:t>
             </a:fld>
             <a:endParaRPr lang="de-DE" dirty="0"/>
           </a:p>
@@ -3144,7 +3145,7 @@
             <a:fld id="{207F274F-E4AE-45D1-8462-735FF203E3CB}" type="datetime1">
               <a:rPr lang="de-DE" smtClean="0"/>
               <a:pPr/>
-              <a:t>04.06.2018</a:t>
+              <a:t>09.06.2018</a:t>
             </a:fld>
             <a:endParaRPr lang="de-DE" dirty="0"/>
           </a:p>
@@ -3263,7 +3264,7 @@
           <a:graphicData uri="http://schemas.openxmlformats.org/presentationml/2006/ole">
             <mc:AlternateContent xmlns:mc="http://schemas.openxmlformats.org/markup-compatibility/2006">
               <mc:Choice xmlns:v="urn:schemas-microsoft-com:vml" Requires="v">
-                <p:oleObj spid="_x0000_s9248" name="think-cell Folie" r:id="rId4" imgW="762" imgH="769" progId="TCLayout.ActiveDocument.1">
+                <p:oleObj spid="_x0000_s9254" name="think-cell Folie" r:id="rId4" imgW="762" imgH="769" progId="TCLayout.ActiveDocument.1">
                   <p:embed/>
                 </p:oleObj>
               </mc:Choice>
@@ -3504,7 +3505,7 @@
             <a:fld id="{207F274F-E4AE-45D1-8462-735FF203E3CB}" type="datetime1">
               <a:rPr lang="de-DE" smtClean="0"/>
               <a:pPr/>
-              <a:t>04.06.2018</a:t>
+              <a:t>09.06.2018</a:t>
             </a:fld>
             <a:endParaRPr lang="de-DE" dirty="0"/>
           </a:p>
@@ -3781,7 +3782,7 @@
             <a:fld id="{207F274F-E4AE-45D1-8462-735FF203E3CB}" type="datetime1">
               <a:rPr lang="de-DE" smtClean="0"/>
               <a:pPr/>
-              <a:t>04.06.2018</a:t>
+              <a:t>09.06.2018</a:t>
             </a:fld>
             <a:endParaRPr lang="de-DE" dirty="0"/>
           </a:p>
@@ -3926,7 +3927,7 @@
             <a:fld id="{207F274F-E4AE-45D1-8462-735FF203E3CB}" type="datetime1">
               <a:rPr lang="de-DE" smtClean="0"/>
               <a:pPr/>
-              <a:t>04.06.2018</a:t>
+              <a:t>09.06.2018</a:t>
             </a:fld>
             <a:endParaRPr lang="de-DE" dirty="0"/>
           </a:p>
@@ -4045,7 +4046,7 @@
           <a:graphicData uri="http://schemas.openxmlformats.org/presentationml/2006/ole">
             <mc:AlternateContent xmlns:mc="http://schemas.openxmlformats.org/markup-compatibility/2006">
               <mc:Choice xmlns:v="urn:schemas-microsoft-com:vml" Requires="v">
-                <p:oleObj spid="_x0000_s3138" name="think-cell Folie" r:id="rId6" imgW="270" imgH="270" progId="TCLayout.ActiveDocument.1">
+                <p:oleObj spid="_x0000_s3144" name="think-cell Folie" r:id="rId6" imgW="270" imgH="270" progId="TCLayout.ActiveDocument.1">
                   <p:embed/>
                 </p:oleObj>
               </mc:Choice>
@@ -4561,7 +4562,7 @@
             <a:fld id="{207F274F-E4AE-45D1-8462-735FF203E3CB}" type="datetime1">
               <a:rPr lang="de-DE" smtClean="0"/>
               <a:pPr/>
-              <a:t>04.06.2018</a:t>
+              <a:t>09.06.2018</a:t>
             </a:fld>
             <a:endParaRPr lang="de-DE" dirty="0"/>
           </a:p>
@@ -4710,7 +4711,7 @@
           <a:graphicData uri="http://schemas.openxmlformats.org/presentationml/2006/ole">
             <mc:AlternateContent xmlns:mc="http://schemas.openxmlformats.org/markup-compatibility/2006">
               <mc:Choice xmlns:v="urn:schemas-microsoft-com:vml" Requires="v">
-                <p:oleObj spid="_x0000_s4161" name="think-cell Folie" r:id="rId7" imgW="270" imgH="270" progId="TCLayout.ActiveDocument.1">
+                <p:oleObj spid="_x0000_s4167" name="think-cell Folie" r:id="rId7" imgW="270" imgH="270" progId="TCLayout.ActiveDocument.1">
                   <p:embed/>
                 </p:oleObj>
               </mc:Choice>
@@ -5043,7 +5044,7 @@
             <a:fld id="{207F274F-E4AE-45D1-8462-735FF203E3CB}" type="datetime1">
               <a:rPr lang="de-DE" smtClean="0"/>
               <a:pPr/>
-              <a:t>04.06.2018</a:t>
+              <a:t>09.06.2018</a:t>
             </a:fld>
             <a:endParaRPr lang="de-DE" dirty="0"/>
           </a:p>
@@ -5167,7 +5168,7 @@
           <a:graphicData uri="http://schemas.openxmlformats.org/presentationml/2006/ole">
             <mc:AlternateContent xmlns:mc="http://schemas.openxmlformats.org/markup-compatibility/2006">
               <mc:Choice xmlns:v="urn:schemas-microsoft-com:vml" Requires="v">
-                <p:oleObj spid="_x0000_s5155" name="think-cell Folie" r:id="rId7" imgW="270" imgH="270" progId="TCLayout.ActiveDocument.1">
+                <p:oleObj spid="_x0000_s5161" name="think-cell Folie" r:id="rId7" imgW="270" imgH="270" progId="TCLayout.ActiveDocument.1">
                   <p:embed/>
                 </p:oleObj>
               </mc:Choice>
@@ -5733,7 +5734,7 @@
           <a:graphicData uri="http://schemas.openxmlformats.org/presentationml/2006/ole">
             <mc:AlternateContent xmlns:mc="http://schemas.openxmlformats.org/markup-compatibility/2006">
               <mc:Choice xmlns:v="urn:schemas-microsoft-com:vml" Requires="v">
-                <p:oleObj spid="_x0000_s13339" name="think-cell Folie" r:id="rId7" imgW="270" imgH="270" progId="TCLayout.ActiveDocument.1">
+                <p:oleObj spid="_x0000_s13345" name="think-cell Folie" r:id="rId7" imgW="270" imgH="270" progId="TCLayout.ActiveDocument.1">
                   <p:embed/>
                 </p:oleObj>
               </mc:Choice>
@@ -6090,7 +6091,7 @@
             <a:fld id="{207F274F-E4AE-45D1-8462-735FF203E3CB}" type="datetime1">
               <a:rPr lang="de-DE" smtClean="0"/>
               <a:pPr/>
-              <a:t>04.06.2018</a:t>
+              <a:t>09.06.2018</a:t>
             </a:fld>
             <a:endParaRPr lang="de-DE" dirty="0"/>
           </a:p>
@@ -6298,7 +6299,7 @@
           <a:graphicData uri="http://schemas.openxmlformats.org/presentationml/2006/ole">
             <mc:AlternateContent xmlns:mc="http://schemas.openxmlformats.org/markup-compatibility/2006">
               <mc:Choice xmlns:v="urn:schemas-microsoft-com:vml" Requires="v">
-                <p:oleObj spid="_x0000_s6178" name="think-cell Folie" r:id="rId7" imgW="270" imgH="270" progId="TCLayout.ActiveDocument.1">
+                <p:oleObj spid="_x0000_s6184" name="think-cell Folie" r:id="rId7" imgW="270" imgH="270" progId="TCLayout.ActiveDocument.1">
                   <p:embed/>
                 </p:oleObj>
               </mc:Choice>
@@ -6864,7 +6865,7 @@
           <a:graphicData uri="http://schemas.openxmlformats.org/presentationml/2006/ole">
             <mc:AlternateContent xmlns:mc="http://schemas.openxmlformats.org/markup-compatibility/2006">
               <mc:Choice xmlns:v="urn:schemas-microsoft-com:vml" Requires="v">
-                <p:oleObj spid="_x0000_s14363" name="think-cell Folie" r:id="rId7" imgW="270" imgH="270" progId="TCLayout.ActiveDocument.1">
+                <p:oleObj spid="_x0000_s14369" name="think-cell Folie" r:id="rId7" imgW="270" imgH="270" progId="TCLayout.ActiveDocument.1">
                   <p:embed/>
                 </p:oleObj>
               </mc:Choice>
@@ -7221,7 +7222,7 @@
             <a:fld id="{207F274F-E4AE-45D1-8462-735FF203E3CB}" type="datetime1">
               <a:rPr lang="de-DE" smtClean="0"/>
               <a:pPr/>
-              <a:t>04.06.2018</a:t>
+              <a:t>09.06.2018</a:t>
             </a:fld>
             <a:endParaRPr lang="de-DE" dirty="0"/>
           </a:p>
@@ -7426,7 +7427,7 @@
           <a:graphicData uri="http://schemas.openxmlformats.org/presentationml/2006/ole">
             <mc:AlternateContent xmlns:mc="http://schemas.openxmlformats.org/markup-compatibility/2006">
               <mc:Choice xmlns:v="urn:schemas-microsoft-com:vml" Requires="v">
-                <p:oleObj spid="_x0000_s7201" name="think-cell Folie" r:id="rId4" imgW="762" imgH="769" progId="TCLayout.ActiveDocument.1">
+                <p:oleObj spid="_x0000_s7207" name="think-cell Folie" r:id="rId4" imgW="762" imgH="769" progId="TCLayout.ActiveDocument.1">
                   <p:embed/>
                 </p:oleObj>
               </mc:Choice>
@@ -7745,7 +7746,7 @@
             <a:fld id="{207F274F-E4AE-45D1-8462-735FF203E3CB}" type="datetime1">
               <a:rPr lang="de-DE" smtClean="0"/>
               <a:pPr/>
-              <a:t>04.06.2018</a:t>
+              <a:t>09.06.2018</a:t>
             </a:fld>
             <a:endParaRPr lang="de-DE" dirty="0"/>
           </a:p>
@@ -7864,7 +7865,7 @@
           <a:graphicData uri="http://schemas.openxmlformats.org/presentationml/2006/ole">
             <mc:AlternateContent xmlns:mc="http://schemas.openxmlformats.org/markup-compatibility/2006">
               <mc:Choice xmlns:v="urn:schemas-microsoft-com:vml" Requires="v">
-                <p:oleObj spid="_x0000_s8224" name="think-cell Folie" r:id="rId4" imgW="762" imgH="769" progId="TCLayout.ActiveDocument.1">
+                <p:oleObj spid="_x0000_s8230" name="think-cell Folie" r:id="rId4" imgW="762" imgH="769" progId="TCLayout.ActiveDocument.1">
                   <p:embed/>
                 </p:oleObj>
               </mc:Choice>
@@ -8219,7 +8220,7 @@
             <a:fld id="{207F274F-E4AE-45D1-8462-735FF203E3CB}" type="datetime1">
               <a:rPr lang="de-DE" smtClean="0"/>
               <a:pPr/>
-              <a:t>04.06.2018</a:t>
+              <a:t>09.06.2018</a:t>
             </a:fld>
             <a:endParaRPr lang="de-DE" dirty="0"/>
           </a:p>
@@ -8633,7 +8634,7 @@
             <a:fld id="{207F274F-E4AE-45D1-8462-735FF203E3CB}" type="datetime1">
               <a:rPr lang="de-DE" smtClean="0"/>
               <a:pPr/>
-              <a:t>04.06.2018</a:t>
+              <a:t>09.06.2018</a:t>
             </a:fld>
             <a:endParaRPr lang="de-DE" dirty="0"/>
           </a:p>
@@ -8803,7 +8804,7 @@
           <a:graphicData uri="http://schemas.openxmlformats.org/presentationml/2006/ole">
             <mc:AlternateContent xmlns:mc="http://schemas.openxmlformats.org/markup-compatibility/2006">
               <mc:Choice xmlns:v="urn:schemas-microsoft-com:vml" Requires="v">
-                <p:oleObj spid="_x0000_s1108" name="think-cell Folie" r:id="rId26" imgW="270" imgH="270" progId="TCLayout.ActiveDocument.1">
+                <p:oleObj spid="_x0000_s1114" name="think-cell Folie" r:id="rId26" imgW="270" imgH="270" progId="TCLayout.ActiveDocument.1">
                   <p:embed/>
                 </p:oleObj>
               </mc:Choice>
@@ -9091,7 +9092,7 @@
             <a:fld id="{207F274F-E4AE-45D1-8462-735FF203E3CB}" type="datetime1">
               <a:rPr lang="de-DE" smtClean="0"/>
               <a:pPr/>
-              <a:t>04.06.2018</a:t>
+              <a:t>09.06.2018</a:t>
             </a:fld>
             <a:endParaRPr lang="de-DE" dirty="0"/>
           </a:p>
@@ -9698,7 +9699,7 @@
           <a:graphicData uri="http://schemas.openxmlformats.org/presentationml/2006/ole">
             <mc:AlternateContent xmlns:mc="http://schemas.openxmlformats.org/markup-compatibility/2006">
               <mc:Choice xmlns:v="urn:schemas-microsoft-com:vml" Requires="v">
-                <p:oleObj spid="_x0000_s10275" name="think-cell Folie" r:id="rId5" imgW="762" imgH="769" progId="TCLayout.ActiveDocument.1">
+                <p:oleObj spid="_x0000_s10281" name="think-cell Folie" r:id="rId5" imgW="762" imgH="769" progId="TCLayout.ActiveDocument.1">
                   <p:embed/>
                 </p:oleObj>
               </mc:Choice>
@@ -9911,7 +9912,7 @@
             <a:fld id="{207F274F-E4AE-45D1-8462-735FF203E3CB}" type="datetime1">
               <a:rPr lang="de-DE" smtClean="0"/>
               <a:pPr/>
-              <a:t>04.06.2018</a:t>
+              <a:t>09.06.2018</a:t>
             </a:fld>
             <a:endParaRPr lang="de-DE" dirty="0"/>
           </a:p>
@@ -10618,11 +10619,6 @@
               </a:rPr>
               <a:t>, UPnP</a:t>
             </a:r>
-            <a:endParaRPr lang="de-DE" sz="1400" dirty="0" smtClean="0">
-              <a:solidFill>
-                <a:schemeClr val="tx1"/>
-              </a:solidFill>
-            </a:endParaRPr>
           </a:p>
         </p:txBody>
       </p:sp>
@@ -10954,7 +10950,7 @@
             <a:fld id="{207F274F-E4AE-45D1-8462-735FF203E3CB}" type="datetime1">
               <a:rPr lang="de-DE" smtClean="0"/>
               <a:pPr/>
-              <a:t>04.06.2018</a:t>
+              <a:t>09.06.2018</a:t>
             </a:fld>
             <a:endParaRPr lang="de-DE" dirty="0"/>
           </a:p>
@@ -12295,7 +12291,7 @@
             <a:fld id="{207F274F-E4AE-45D1-8462-735FF203E3CB}" type="datetime1">
               <a:rPr lang="de-DE" smtClean="0"/>
               <a:pPr/>
-              <a:t>04.06.2018</a:t>
+              <a:t>09.06.2018</a:t>
             </a:fld>
             <a:endParaRPr lang="de-DE" dirty="0"/>
           </a:p>
@@ -14212,7 +14208,7 @@
             <a:fld id="{207F274F-E4AE-45D1-8462-735FF203E3CB}" type="datetime1">
               <a:rPr lang="de-DE" smtClean="0"/>
               <a:pPr/>
-              <a:t>04.06.2018</a:t>
+              <a:t>09.06.2018</a:t>
             </a:fld>
             <a:endParaRPr lang="de-DE" dirty="0"/>
           </a:p>
@@ -14632,31 +14628,7 @@
                   <a:schemeClr val="tx1"/>
                 </a:solidFill>
               </a:rPr>
-              <a:t> </a:t>
-            </a:r>
-            <a:r>
-              <a:rPr lang="de-DE" sz="1400" dirty="0" smtClean="0">
-                <a:solidFill>
-                  <a:schemeClr val="tx1"/>
-                </a:solidFill>
-              </a:rPr>
-              <a:t>unterstützt bei Multicast nur Pub/Sub, d.h. </a:t>
-            </a:r>
-            <a:r>
-              <a:rPr lang="de-DE" sz="1400" dirty="0" smtClean="0">
-                <a:solidFill>
-                  <a:schemeClr val="tx1"/>
-                </a:solidFill>
-              </a:rPr>
-              <a:t>kein </a:t>
-            </a:r>
-            <a:r>
-              <a:rPr lang="de-DE" sz="1400" dirty="0" smtClean="0">
-                <a:solidFill>
-                  <a:schemeClr val="tx1"/>
-                </a:solidFill>
-              </a:rPr>
-              <a:t>Load </a:t>
+              <a:t> unterstützt bei Multicast nur Pub/Sub, d.h. kein Load </a:t>
             </a:r>
             <a:r>
               <a:rPr lang="de-DE" sz="1400" dirty="0" err="1" smtClean="0">
@@ -15075,7 +15047,7 @@
             <a:fld id="{207F274F-E4AE-45D1-8462-735FF203E3CB}" type="datetime1">
               <a:rPr lang="de-DE" smtClean="0"/>
               <a:pPr/>
-              <a:t>04.06.2018</a:t>
+              <a:t>09.06.2018</a:t>
             </a:fld>
             <a:endParaRPr lang="de-DE" dirty="0"/>
           </a:p>
@@ -15417,7 +15389,7 @@
             <a:fld id="{207F274F-E4AE-45D1-8462-735FF203E3CB}" type="datetime1">
               <a:rPr lang="de-DE" smtClean="0"/>
               <a:pPr/>
-              <a:t>04.06.2018</a:t>
+              <a:t>09.06.2018</a:t>
             </a:fld>
             <a:endParaRPr lang="de-DE" dirty="0"/>
           </a:p>
@@ -15747,11 +15719,6 @@
               </a:rPr>
               <a:t>-kompatibel)</a:t>
             </a:r>
-            <a:endParaRPr lang="de-DE" sz="1400" dirty="0" smtClean="0">
-              <a:solidFill>
-                <a:schemeClr val="tx1"/>
-              </a:solidFill>
-            </a:endParaRPr>
           </a:p>
         </p:txBody>
       </p:sp>
@@ -15914,11 +15881,6 @@
               </a:rPr>
               <a:t>Dynamisch, keine Persistenz, keine Pufferung</a:t>
             </a:r>
-            <a:endParaRPr lang="de-DE" sz="1400" dirty="0" smtClean="0">
-              <a:solidFill>
-                <a:schemeClr val="tx1"/>
-              </a:solidFill>
-            </a:endParaRPr>
           </a:p>
         </p:txBody>
       </p:sp>
@@ -16062,11 +16024,6 @@
               </a:rPr>
               <a:t>.</a:t>
             </a:r>
-            <a:endParaRPr lang="de-DE" sz="1400" dirty="0" smtClean="0">
-              <a:solidFill>
-                <a:schemeClr val="tx1"/>
-              </a:solidFill>
-            </a:endParaRPr>
           </a:p>
         </p:txBody>
       </p:sp>
@@ -16212,11 +16169,6 @@
               </a:rPr>
               <a:t>, koordiniert über NORM Command Messages</a:t>
             </a:r>
-            <a:endParaRPr lang="de-DE" sz="1400" dirty="0" smtClean="0">
-              <a:solidFill>
-                <a:schemeClr val="tx1"/>
-              </a:solidFill>
-            </a:endParaRPr>
           </a:p>
         </p:txBody>
       </p:sp>
@@ -16409,11 +16361,6 @@
               </a:rPr>
               <a:t>)</a:t>
             </a:r>
-            <a:endParaRPr lang="de-DE" sz="1400" dirty="0" smtClean="0">
-              <a:solidFill>
-                <a:schemeClr val="tx1"/>
-              </a:solidFill>
-            </a:endParaRPr>
           </a:p>
         </p:txBody>
       </p:sp>
@@ -16526,7 +16473,7 @@
             <a:fld id="{207F274F-E4AE-45D1-8462-735FF203E3CB}" type="datetime1">
               <a:rPr lang="de-DE" smtClean="0"/>
               <a:pPr/>
-              <a:t>04.06.2018</a:t>
+              <a:t>09.06.2018</a:t>
             </a:fld>
             <a:endParaRPr lang="de-DE" dirty="0"/>
           </a:p>
@@ -16578,7 +16525,7 @@
           <a:graphicData uri="http://schemas.openxmlformats.org/presentationml/2006/ole">
             <mc:AlternateContent xmlns:mc="http://schemas.openxmlformats.org/markup-compatibility/2006">
               <mc:Choice xmlns:v="urn:schemas-microsoft-com:vml" Requires="v">
-                <p:oleObj spid="_x0000_s17420" name="Visio" r:id="rId3" imgW="7248604" imgH="5287518" progId="Visio.Drawing.11">
+                <p:oleObj spid="_x0000_s17426" name="Visio" r:id="rId3" imgW="7248604" imgH="5287518" progId="Visio.Drawing.11">
                   <p:embed/>
                 </p:oleObj>
               </mc:Choice>
@@ -17781,6 +17728,802 @@
     <p:extLst>
       <p:ext uri="{BB962C8B-B14F-4D97-AF65-F5344CB8AC3E}">
         <p14:creationId xmlns:p14="http://schemas.microsoft.com/office/powerpoint/2010/main" val="3884563308"/>
+      </p:ext>
+    </p:extLst>
+  </p:cSld>
+  <p:clrMapOvr>
+    <a:masterClrMapping/>
+  </p:clrMapOvr>
+  <mc:AlternateContent xmlns:mc="http://schemas.openxmlformats.org/markup-compatibility/2006" xmlns:p14="http://schemas.microsoft.com/office/powerpoint/2010/main">
+    <mc:Choice Requires="p14">
+      <p:transition p14:dur="0"/>
+    </mc:Choice>
+    <mc:Fallback xmlns="">
+      <p:transition/>
+    </mc:Fallback>
+  </mc:AlternateContent>
+  <p:timing>
+    <p:tnLst>
+      <p:par>
+        <p:cTn id="1" dur="indefinite" restart="never" nodeType="tmRoot"/>
+      </p:par>
+    </p:tnLst>
+  </p:timing>
+</p:sld>
+</file>
+
+<file path=ppt/slides/slide17.xml><?xml version="1.0" encoding="utf-8"?>
+<p:sld xmlns:a="http://schemas.openxmlformats.org/drawingml/2006/main" xmlns:r="http://schemas.openxmlformats.org/officeDocument/2006/relationships" xmlns:p="http://schemas.openxmlformats.org/presentationml/2006/main">
+  <p:cSld>
+    <p:spTree>
+      <p:nvGrpSpPr>
+        <p:cNvPr id="1" name=""/>
+        <p:cNvGrpSpPr/>
+        <p:nvPr/>
+      </p:nvGrpSpPr>
+      <p:grpSpPr>
+        <a:xfrm>
+          <a:off x="0" y="0"/>
+          <a:ext cx="0" cy="0"/>
+          <a:chOff x="0" y="0"/>
+          <a:chExt cx="0" cy="0"/>
+        </a:xfrm>
+      </p:grpSpPr>
+      <p:sp>
+        <p:nvSpPr>
+          <p:cNvPr id="2" name="Textplatzhalter 1"/>
+          <p:cNvSpPr>
+            <a:spLocks noGrp="1"/>
+          </p:cNvSpPr>
+          <p:nvPr>
+            <p:ph type="body" sz="quarter" idx="17"/>
+          </p:nvPr>
+        </p:nvSpPr>
+        <p:spPr/>
+        <p:txBody>
+          <a:bodyPr/>
+          <a:lstStyle/>
+          <a:p>
+            <a:r>
+              <a:rPr lang="de-DE" dirty="0" smtClean="0"/>
+              <a:t>machen</a:t>
+            </a:r>
+            <a:endParaRPr lang="de-DE" dirty="0"/>
+          </a:p>
+        </p:txBody>
+      </p:sp>
+      <p:sp>
+        <p:nvSpPr>
+          <p:cNvPr id="3" name="Titel 2"/>
+          <p:cNvSpPr>
+            <a:spLocks noGrp="1"/>
+          </p:cNvSpPr>
+          <p:nvPr>
+            <p:ph type="title"/>
+          </p:nvPr>
+        </p:nvSpPr>
+        <p:spPr/>
+        <p:txBody>
+          <a:bodyPr/>
+          <a:lstStyle/>
+          <a:p>
+            <a:r>
+              <a:rPr lang="de-DE" dirty="0" smtClean="0"/>
+              <a:t>Fazit, </a:t>
+            </a:r>
+            <a:r>
+              <a:rPr lang="de-DE" dirty="0" err="1" smtClean="0"/>
+              <a:t>Lessons</a:t>
+            </a:r>
+            <a:r>
+              <a:rPr lang="de-DE" dirty="0" smtClean="0"/>
+              <a:t> </a:t>
+            </a:r>
+            <a:r>
+              <a:rPr lang="de-DE" dirty="0" err="1" smtClean="0"/>
+              <a:t>learned</a:t>
+            </a:r>
+            <a:r>
+              <a:rPr lang="de-DE" dirty="0" smtClean="0"/>
+              <a:t> </a:t>
+            </a:r>
+            <a:r>
+              <a:rPr lang="de-DE" smtClean="0"/>
+              <a:t>und Schlussbemerkung</a:t>
+            </a:r>
+            <a:endParaRPr lang="de-DE" dirty="0"/>
+          </a:p>
+        </p:txBody>
+      </p:sp>
+      <p:sp>
+        <p:nvSpPr>
+          <p:cNvPr id="4" name="Datumsplatzhalter 3"/>
+          <p:cNvSpPr>
+            <a:spLocks noGrp="1"/>
+          </p:cNvSpPr>
+          <p:nvPr>
+            <p:ph type="dt" sz="half" idx="18"/>
+          </p:nvPr>
+        </p:nvSpPr>
+        <p:spPr/>
+        <p:txBody>
+          <a:bodyPr/>
+          <a:lstStyle/>
+          <a:p>
+            <a:fld id="{207F274F-E4AE-45D1-8462-735FF203E3CB}" type="datetime1">
+              <a:rPr lang="de-DE" smtClean="0"/>
+              <a:pPr/>
+              <a:t>09.06.2018</a:t>
+            </a:fld>
+            <a:endParaRPr lang="de-DE" dirty="0"/>
+          </a:p>
+        </p:txBody>
+      </p:sp>
+      <p:sp>
+        <p:nvSpPr>
+          <p:cNvPr id="5" name="Foliennummernplatzhalter 4"/>
+          <p:cNvSpPr>
+            <a:spLocks noGrp="1"/>
+          </p:cNvSpPr>
+          <p:nvPr>
+            <p:ph type="sldNum" sz="quarter" idx="20"/>
+          </p:nvPr>
+        </p:nvSpPr>
+        <p:spPr/>
+        <p:txBody>
+          <a:bodyPr/>
+          <a:lstStyle/>
+          <a:p>
+            <a:fld id="{ACC26C6A-0CF6-4B2A-95E7-F1C069A12223}" type="slidenum">
+              <a:rPr lang="de-DE" smtClean="0"/>
+              <a:pPr/>
+              <a:t>17</a:t>
+            </a:fld>
+            <a:endParaRPr lang="de-DE"/>
+          </a:p>
+        </p:txBody>
+      </p:sp>
+      <p:sp>
+        <p:nvSpPr>
+          <p:cNvPr id="6" name="Rechteck 5"/>
+          <p:cNvSpPr/>
+          <p:nvPr/>
+        </p:nvSpPr>
+        <p:spPr bwMode="gray">
+          <a:xfrm>
+            <a:off x="7176120" y="4509120"/>
+            <a:ext cx="3744416" cy="1440160"/>
+          </a:xfrm>
+          <a:prstGeom prst="rect">
+            <a:avLst/>
+          </a:prstGeom>
+          <a:solidFill>
+            <a:schemeClr val="accent6"/>
+          </a:solidFill>
+          <a:ln w="9525">
+            <a:solidFill>
+              <a:schemeClr val="tx1"/>
+            </a:solidFill>
+          </a:ln>
+        </p:spPr>
+        <p:style>
+          <a:lnRef idx="2">
+            <a:schemeClr val="accent1">
+              <a:shade val="50000"/>
+            </a:schemeClr>
+          </a:lnRef>
+          <a:fillRef idx="1">
+            <a:schemeClr val="accent1"/>
+          </a:fillRef>
+          <a:effectRef idx="0">
+            <a:schemeClr val="accent1"/>
+          </a:effectRef>
+          <a:fontRef idx="minor">
+            <a:schemeClr val="lt1"/>
+          </a:fontRef>
+        </p:style>
+        <p:txBody>
+          <a:bodyPr rtlCol="0" anchor="ctr"/>
+          <a:lstStyle/>
+          <a:p>
+            <a:pPr algn="ctr"/>
+            <a:r>
+              <a:rPr lang="de-DE" sz="1400" dirty="0" smtClean="0">
+                <a:solidFill>
+                  <a:schemeClr val="tx1"/>
+                </a:solidFill>
+              </a:rPr>
+              <a:t>Der Name </a:t>
+            </a:r>
+            <a:r>
+              <a:rPr lang="de-DE" sz="1400" b="1" dirty="0" err="1" smtClean="0">
+                <a:solidFill>
+                  <a:schemeClr val="tx1"/>
+                </a:solidFill>
+              </a:rPr>
+              <a:t>msm</a:t>
+            </a:r>
+            <a:r>
+              <a:rPr lang="de-DE" sz="1400" dirty="0" smtClean="0">
+                <a:solidFill>
+                  <a:schemeClr val="tx1"/>
+                </a:solidFill>
+              </a:rPr>
+              <a:t> (Micro Service </a:t>
+            </a:r>
+            <a:r>
+              <a:rPr lang="de-DE" sz="1400" dirty="0" err="1" smtClean="0">
+                <a:solidFill>
+                  <a:schemeClr val="tx1"/>
+                </a:solidFill>
+              </a:rPr>
+              <a:t>Mesh</a:t>
+            </a:r>
+            <a:r>
+              <a:rPr lang="de-DE" sz="1400" dirty="0" smtClean="0">
+                <a:solidFill>
+                  <a:schemeClr val="tx1"/>
+                </a:solidFill>
+              </a:rPr>
+              <a:t>) stammt noch aus einer früheren Phase des Projektes. Aber für Micro Services ist so eine gemeinsame Library eine problematische Abhängigkeit (gilt für alle mir bekannten </a:t>
+            </a:r>
+            <a:r>
+              <a:rPr lang="de-DE" sz="1400" dirty="0" err="1" smtClean="0">
+                <a:solidFill>
+                  <a:schemeClr val="tx1"/>
+                </a:solidFill>
+              </a:rPr>
+              <a:t>Meshes</a:t>
+            </a:r>
+            <a:r>
+              <a:rPr lang="de-DE" sz="1400" dirty="0" smtClean="0">
+                <a:solidFill>
+                  <a:schemeClr val="tx1"/>
+                </a:solidFill>
+              </a:rPr>
+              <a:t>)</a:t>
+            </a:r>
+          </a:p>
+        </p:txBody>
+      </p:sp>
+      <p:sp>
+        <p:nvSpPr>
+          <p:cNvPr id="7" name="Rechteck 6"/>
+          <p:cNvSpPr/>
+          <p:nvPr/>
+        </p:nvSpPr>
+        <p:spPr bwMode="gray">
+          <a:xfrm>
+            <a:off x="839416" y="1628800"/>
+            <a:ext cx="3744416" cy="864096"/>
+          </a:xfrm>
+          <a:prstGeom prst="rect">
+            <a:avLst/>
+          </a:prstGeom>
+          <a:solidFill>
+            <a:schemeClr val="accent6"/>
+          </a:solidFill>
+          <a:ln w="9525">
+            <a:solidFill>
+              <a:schemeClr val="tx1"/>
+            </a:solidFill>
+          </a:ln>
+        </p:spPr>
+        <p:style>
+          <a:lnRef idx="2">
+            <a:schemeClr val="accent1">
+              <a:shade val="50000"/>
+            </a:schemeClr>
+          </a:lnRef>
+          <a:fillRef idx="1">
+            <a:schemeClr val="accent1"/>
+          </a:fillRef>
+          <a:effectRef idx="0">
+            <a:schemeClr val="accent1"/>
+          </a:effectRef>
+          <a:fontRef idx="minor">
+            <a:schemeClr val="lt1"/>
+          </a:fontRef>
+        </p:style>
+        <p:txBody>
+          <a:bodyPr rtlCol="0" anchor="ctr"/>
+          <a:lstStyle/>
+          <a:p>
+            <a:pPr algn="ctr"/>
+            <a:r>
+              <a:rPr lang="de-DE" sz="1400" dirty="0" smtClean="0">
+                <a:solidFill>
+                  <a:schemeClr val="tx1"/>
+                </a:solidFill>
+              </a:rPr>
+              <a:t>Serverlose </a:t>
+            </a:r>
+            <a:r>
+              <a:rPr lang="de-DE" sz="1400" dirty="0" err="1" smtClean="0">
+                <a:solidFill>
+                  <a:schemeClr val="tx1"/>
+                </a:solidFill>
+              </a:rPr>
+              <a:t>low-latency</a:t>
+            </a:r>
+            <a:r>
+              <a:rPr lang="de-DE" sz="1400" dirty="0" smtClean="0">
+                <a:solidFill>
+                  <a:schemeClr val="tx1"/>
+                </a:solidFill>
+              </a:rPr>
+              <a:t> </a:t>
+            </a:r>
+            <a:r>
+              <a:rPr lang="de-DE" sz="1400" dirty="0" err="1" smtClean="0">
+                <a:solidFill>
+                  <a:schemeClr val="tx1"/>
+                </a:solidFill>
+              </a:rPr>
+              <a:t>middleware</a:t>
+            </a:r>
+            <a:r>
+              <a:rPr lang="de-DE" sz="1400" dirty="0" smtClean="0">
+                <a:solidFill>
+                  <a:schemeClr val="tx1"/>
+                </a:solidFill>
+              </a:rPr>
+              <a:t> ist machbar, Performance und Stabilität wie erwartet.</a:t>
+            </a:r>
+          </a:p>
+        </p:txBody>
+      </p:sp>
+      <p:sp>
+        <p:nvSpPr>
+          <p:cNvPr id="8" name="Rechteck 7"/>
+          <p:cNvSpPr/>
+          <p:nvPr/>
+        </p:nvSpPr>
+        <p:spPr bwMode="gray">
+          <a:xfrm>
+            <a:off x="5159896" y="1412776"/>
+            <a:ext cx="3528392" cy="864096"/>
+          </a:xfrm>
+          <a:prstGeom prst="rect">
+            <a:avLst/>
+          </a:prstGeom>
+          <a:solidFill>
+            <a:schemeClr val="accent6"/>
+          </a:solidFill>
+          <a:ln w="9525">
+            <a:solidFill>
+              <a:schemeClr val="tx1"/>
+            </a:solidFill>
+          </a:ln>
+        </p:spPr>
+        <p:style>
+          <a:lnRef idx="2">
+            <a:schemeClr val="accent1">
+              <a:shade val="50000"/>
+            </a:schemeClr>
+          </a:lnRef>
+          <a:fillRef idx="1">
+            <a:schemeClr val="accent1"/>
+          </a:fillRef>
+          <a:effectRef idx="0">
+            <a:schemeClr val="accent1"/>
+          </a:effectRef>
+          <a:fontRef idx="minor">
+            <a:schemeClr val="lt1"/>
+          </a:fontRef>
+        </p:style>
+        <p:txBody>
+          <a:bodyPr rtlCol="0" anchor="ctr"/>
+          <a:lstStyle/>
+          <a:p>
+            <a:pPr algn="ctr"/>
+            <a:r>
+              <a:rPr lang="de-DE" sz="1400" dirty="0" smtClean="0">
+                <a:solidFill>
+                  <a:schemeClr val="tx1"/>
+                </a:solidFill>
+              </a:rPr>
+              <a:t>Multicast über UDP ist unproblematisch. Paketverluste in heutigen Netzen vernachlässigbar</a:t>
+            </a:r>
+          </a:p>
+        </p:txBody>
+      </p:sp>
+      <p:sp>
+        <p:nvSpPr>
+          <p:cNvPr id="10" name="Rechteck 9"/>
+          <p:cNvSpPr/>
+          <p:nvPr/>
+        </p:nvSpPr>
+        <p:spPr bwMode="gray">
+          <a:xfrm>
+            <a:off x="1433482" y="5197286"/>
+            <a:ext cx="3276364" cy="1080120"/>
+          </a:xfrm>
+          <a:prstGeom prst="rect">
+            <a:avLst/>
+          </a:prstGeom>
+          <a:solidFill>
+            <a:schemeClr val="accent6"/>
+          </a:solidFill>
+          <a:ln w="9525">
+            <a:solidFill>
+              <a:schemeClr val="tx1"/>
+            </a:solidFill>
+          </a:ln>
+        </p:spPr>
+        <p:style>
+          <a:lnRef idx="2">
+            <a:schemeClr val="accent1">
+              <a:shade val="50000"/>
+            </a:schemeClr>
+          </a:lnRef>
+          <a:fillRef idx="1">
+            <a:schemeClr val="accent1"/>
+          </a:fillRef>
+          <a:effectRef idx="0">
+            <a:schemeClr val="accent1"/>
+          </a:effectRef>
+          <a:fontRef idx="minor">
+            <a:schemeClr val="lt1"/>
+          </a:fontRef>
+        </p:style>
+        <p:txBody>
+          <a:bodyPr rtlCol="0" anchor="ctr"/>
+          <a:lstStyle/>
+          <a:p>
+            <a:pPr algn="ctr"/>
+            <a:r>
+              <a:rPr lang="de-DE" sz="1400" b="1" dirty="0" err="1" smtClean="0">
+                <a:solidFill>
+                  <a:schemeClr val="tx1"/>
+                </a:solidFill>
+              </a:rPr>
+              <a:t>clojure.core.async</a:t>
+            </a:r>
+            <a:r>
+              <a:rPr lang="de-DE" sz="1400" dirty="0" smtClean="0">
+                <a:solidFill>
+                  <a:schemeClr val="tx1"/>
+                </a:solidFill>
+              </a:rPr>
+              <a:t> ist stabil, </a:t>
+            </a:r>
+            <a:r>
+              <a:rPr lang="de-DE" sz="1400" dirty="0" err="1" smtClean="0">
+                <a:solidFill>
+                  <a:schemeClr val="tx1"/>
+                </a:solidFill>
+              </a:rPr>
+              <a:t>Exceptions</a:t>
+            </a:r>
+            <a:r>
+              <a:rPr lang="de-DE" sz="1400" dirty="0" smtClean="0">
+                <a:solidFill>
+                  <a:schemeClr val="tx1"/>
+                </a:solidFill>
+              </a:rPr>
+              <a:t> in </a:t>
+            </a:r>
+            <a:r>
+              <a:rPr lang="de-DE" sz="1400" dirty="0" err="1" smtClean="0">
+                <a:solidFill>
+                  <a:schemeClr val="tx1"/>
+                </a:solidFill>
+              </a:rPr>
+              <a:t>go</a:t>
+            </a:r>
+            <a:r>
+              <a:rPr lang="de-DE" sz="1400" dirty="0" smtClean="0">
+                <a:solidFill>
+                  <a:schemeClr val="tx1"/>
+                </a:solidFill>
+              </a:rPr>
+              <a:t>-Blöcken sind aber kaum </a:t>
+            </a:r>
+            <a:r>
+              <a:rPr lang="de-DE" sz="1400" dirty="0" err="1" smtClean="0">
+                <a:solidFill>
+                  <a:schemeClr val="tx1"/>
+                </a:solidFill>
+              </a:rPr>
+              <a:t>rückverfolgbar</a:t>
+            </a:r>
+            <a:r>
+              <a:rPr lang="de-DE" sz="1400" dirty="0" smtClean="0">
+                <a:solidFill>
+                  <a:schemeClr val="tx1"/>
+                </a:solidFill>
+              </a:rPr>
+              <a:t>.</a:t>
+            </a:r>
+          </a:p>
+          <a:p>
+            <a:pPr algn="ctr"/>
+            <a:r>
+              <a:rPr lang="de-DE" sz="1400" b="1" dirty="0" err="1" smtClean="0">
+                <a:solidFill>
+                  <a:schemeClr val="tx1"/>
+                </a:solidFill>
+              </a:rPr>
+              <a:t>RxClojure</a:t>
+            </a:r>
+            <a:r>
+              <a:rPr lang="de-DE" sz="1400" dirty="0" smtClean="0">
+                <a:solidFill>
+                  <a:schemeClr val="tx1"/>
+                </a:solidFill>
+              </a:rPr>
+              <a:t> war noch schlimmer</a:t>
+            </a:r>
+          </a:p>
+        </p:txBody>
+      </p:sp>
+      <p:sp>
+        <p:nvSpPr>
+          <p:cNvPr id="11" name="Rechteck 10"/>
+          <p:cNvSpPr/>
+          <p:nvPr/>
+        </p:nvSpPr>
+        <p:spPr bwMode="gray">
+          <a:xfrm>
+            <a:off x="6744072" y="2855307"/>
+            <a:ext cx="3528392" cy="864096"/>
+          </a:xfrm>
+          <a:prstGeom prst="rect">
+            <a:avLst/>
+          </a:prstGeom>
+          <a:solidFill>
+            <a:schemeClr val="accent6"/>
+          </a:solidFill>
+          <a:ln w="9525">
+            <a:solidFill>
+              <a:schemeClr val="tx1"/>
+            </a:solidFill>
+          </a:ln>
+        </p:spPr>
+        <p:style>
+          <a:lnRef idx="2">
+            <a:schemeClr val="accent1">
+              <a:shade val="50000"/>
+            </a:schemeClr>
+          </a:lnRef>
+          <a:fillRef idx="1">
+            <a:schemeClr val="accent1"/>
+          </a:fillRef>
+          <a:effectRef idx="0">
+            <a:schemeClr val="accent1"/>
+          </a:effectRef>
+          <a:fontRef idx="minor">
+            <a:schemeClr val="lt1"/>
+          </a:fontRef>
+        </p:style>
+        <p:txBody>
+          <a:bodyPr rtlCol="0" anchor="ctr"/>
+          <a:lstStyle/>
+          <a:p>
+            <a:pPr algn="ctr"/>
+            <a:r>
+              <a:rPr lang="de-DE" sz="1400" dirty="0" err="1" smtClean="0">
+                <a:solidFill>
+                  <a:schemeClr val="tx1"/>
+                </a:solidFill>
+              </a:rPr>
+              <a:t>Transducer</a:t>
+            </a:r>
+            <a:r>
+              <a:rPr lang="de-DE" sz="1400" dirty="0" smtClean="0">
+                <a:solidFill>
+                  <a:schemeClr val="tx1"/>
+                </a:solidFill>
+              </a:rPr>
+              <a:t> sind total cool, sobald es gelungen ist, das Hirn um das Konzept </a:t>
+            </a:r>
+            <a:r>
+              <a:rPr lang="de-DE" sz="1400" dirty="0" err="1" smtClean="0">
+                <a:solidFill>
+                  <a:schemeClr val="tx1"/>
+                </a:solidFill>
+              </a:rPr>
+              <a:t>herumzufalten</a:t>
+            </a:r>
+            <a:r>
+              <a:rPr lang="de-DE" sz="1400" dirty="0" smtClean="0">
+                <a:solidFill>
+                  <a:schemeClr val="tx1"/>
+                </a:solidFill>
+              </a:rPr>
+              <a:t>.</a:t>
+            </a:r>
+          </a:p>
+        </p:txBody>
+      </p:sp>
+      <p:sp>
+        <p:nvSpPr>
+          <p:cNvPr id="13" name="Rechteck 12"/>
+          <p:cNvSpPr/>
+          <p:nvPr/>
+        </p:nvSpPr>
+        <p:spPr bwMode="gray">
+          <a:xfrm>
+            <a:off x="1055440" y="2855307"/>
+            <a:ext cx="4896544" cy="1944216"/>
+          </a:xfrm>
+          <a:prstGeom prst="rect">
+            <a:avLst/>
+          </a:prstGeom>
+          <a:solidFill>
+            <a:schemeClr val="accent6"/>
+          </a:solidFill>
+          <a:ln w="9525">
+            <a:solidFill>
+              <a:schemeClr val="tx1"/>
+            </a:solidFill>
+          </a:ln>
+        </p:spPr>
+        <p:style>
+          <a:lnRef idx="2">
+            <a:schemeClr val="accent1">
+              <a:shade val="50000"/>
+            </a:schemeClr>
+          </a:lnRef>
+          <a:fillRef idx="1">
+            <a:schemeClr val="accent1"/>
+          </a:fillRef>
+          <a:effectRef idx="0">
+            <a:schemeClr val="accent1"/>
+          </a:effectRef>
+          <a:fontRef idx="minor">
+            <a:schemeClr val="lt1"/>
+          </a:fontRef>
+        </p:style>
+        <p:txBody>
+          <a:bodyPr rtlCol="0" anchor="ctr"/>
+          <a:lstStyle/>
+          <a:p>
+            <a:pPr algn="ctr"/>
+            <a:r>
+              <a:rPr lang="de-DE" sz="1400" b="1" dirty="0" smtClean="0">
+                <a:solidFill>
+                  <a:schemeClr val="tx1"/>
+                </a:solidFill>
+              </a:rPr>
+              <a:t>Einsatzbedingungen</a:t>
+            </a:r>
+          </a:p>
+          <a:p>
+            <a:pPr marL="285750" indent="-285750">
+              <a:buFont typeface="Arial" panose="020B0604020202020204" pitchFamily="34" charset="0"/>
+              <a:buChar char="•"/>
+            </a:pPr>
+            <a:r>
+              <a:rPr lang="de-DE" sz="1400" dirty="0" smtClean="0">
+                <a:solidFill>
+                  <a:schemeClr val="tx1"/>
+                </a:solidFill>
+              </a:rPr>
+              <a:t>Weg ist weg. Nachrichten werden nicht vorgehalten. Es </a:t>
+            </a:r>
+            <a:r>
+              <a:rPr lang="de-DE" sz="1400" dirty="0" err="1" smtClean="0">
+                <a:solidFill>
+                  <a:schemeClr val="tx1"/>
+                </a:solidFill>
+              </a:rPr>
+              <a:t>git</a:t>
+            </a:r>
+            <a:r>
+              <a:rPr lang="de-DE" sz="1400" dirty="0" smtClean="0">
+                <a:solidFill>
+                  <a:schemeClr val="tx1"/>
+                </a:solidFill>
+              </a:rPr>
+              <a:t> aber auch keinen Rückstau.</a:t>
+            </a:r>
+          </a:p>
+          <a:p>
+            <a:pPr marL="285750" indent="-285750">
+              <a:buFont typeface="Arial" panose="020B0604020202020204" pitchFamily="34" charset="0"/>
+              <a:buChar char="•"/>
+            </a:pPr>
+            <a:r>
+              <a:rPr lang="de-DE" sz="1400" dirty="0" smtClean="0">
+                <a:solidFill>
+                  <a:schemeClr val="tx1"/>
+                </a:solidFill>
+              </a:rPr>
+              <a:t>Keine Transaktionen. Nachrichten, die  während der Verarbeitung verloren gehen sind auch weg.</a:t>
+            </a:r>
+          </a:p>
+          <a:p>
+            <a:pPr marL="285750" indent="-285750">
+              <a:buFont typeface="Arial" panose="020B0604020202020204" pitchFamily="34" charset="0"/>
+              <a:buChar char="•"/>
+            </a:pPr>
+            <a:r>
+              <a:rPr lang="de-DE" sz="1400" dirty="0" smtClean="0">
+                <a:solidFill>
+                  <a:schemeClr val="tx1"/>
+                </a:solidFill>
+              </a:rPr>
+              <a:t>Für die Verarbeitung von Live-Bewegungsdaten ist das meistens kein Problem </a:t>
+            </a:r>
+          </a:p>
+        </p:txBody>
+      </p:sp>
+      <p:sp>
+        <p:nvSpPr>
+          <p:cNvPr id="9" name="Rechteck 8"/>
+          <p:cNvSpPr/>
+          <p:nvPr/>
+        </p:nvSpPr>
+        <p:spPr bwMode="gray">
+          <a:xfrm>
+            <a:off x="5015880" y="5197286"/>
+            <a:ext cx="1908212" cy="751994"/>
+          </a:xfrm>
+          <a:prstGeom prst="rect">
+            <a:avLst/>
+          </a:prstGeom>
+          <a:solidFill>
+            <a:schemeClr val="accent6"/>
+          </a:solidFill>
+          <a:ln w="9525">
+            <a:solidFill>
+              <a:schemeClr val="tx1"/>
+            </a:solidFill>
+          </a:ln>
+        </p:spPr>
+        <p:style>
+          <a:lnRef idx="2">
+            <a:schemeClr val="accent1">
+              <a:shade val="50000"/>
+            </a:schemeClr>
+          </a:lnRef>
+          <a:fillRef idx="1">
+            <a:schemeClr val="accent1"/>
+          </a:fillRef>
+          <a:effectRef idx="0">
+            <a:schemeClr val="accent1"/>
+          </a:effectRef>
+          <a:fontRef idx="minor">
+            <a:schemeClr val="lt1"/>
+          </a:fontRef>
+        </p:style>
+        <p:txBody>
+          <a:bodyPr rtlCol="0" anchor="ctr"/>
+          <a:lstStyle/>
+          <a:p>
+            <a:pPr algn="ctr"/>
+            <a:r>
+              <a:rPr lang="de-DE" sz="1400" dirty="0">
+                <a:solidFill>
+                  <a:schemeClr val="tx1"/>
+                </a:solidFill>
+              </a:rPr>
+              <a:t>Funktioniert </a:t>
+            </a:r>
+            <a:br>
+              <a:rPr lang="de-DE" sz="1400" dirty="0">
+                <a:solidFill>
+                  <a:schemeClr val="tx1"/>
+                </a:solidFill>
+              </a:rPr>
+            </a:br>
+            <a:r>
+              <a:rPr lang="de-DE" sz="1400" dirty="0">
+                <a:solidFill>
+                  <a:schemeClr val="tx1"/>
+                </a:solidFill>
+              </a:rPr>
+              <a:t>auch bei Zimmertemperatur</a:t>
+            </a:r>
+          </a:p>
+        </p:txBody>
+      </p:sp>
+    </p:spTree>
+    <p:extLst>
+      <p:ext uri="{BB962C8B-B14F-4D97-AF65-F5344CB8AC3E}">
+        <p14:creationId xmlns:p14="http://schemas.microsoft.com/office/powerpoint/2010/main" val="3022146536"/>
       </p:ext>
     </p:extLst>
   </p:cSld>
@@ -17859,7 +18602,7 @@
             <a:fld id="{207F274F-E4AE-45D1-8462-735FF203E3CB}" type="datetime1">
               <a:rPr lang="de-DE" smtClean="0"/>
               <a:pPr/>
-              <a:t>04.06.2018</a:t>
+              <a:t>09.06.2018</a:t>
             </a:fld>
             <a:endParaRPr lang="de-DE" dirty="0"/>
           </a:p>
@@ -18235,7 +18978,7 @@
             <a:fld id="{207F274F-E4AE-45D1-8462-735FF203E3CB}" type="datetime1">
               <a:rPr lang="de-DE" smtClean="0"/>
               <a:pPr/>
-              <a:t>04.06.2018</a:t>
+              <a:t>09.06.2018</a:t>
             </a:fld>
             <a:endParaRPr lang="de-DE" dirty="0"/>
           </a:p>
@@ -18538,7 +19281,7 @@
           <a:graphicData uri="http://schemas.openxmlformats.org/presentationml/2006/ole">
             <mc:AlternateContent xmlns:mc="http://schemas.openxmlformats.org/markup-compatibility/2006">
               <mc:Choice xmlns:v="urn:schemas-microsoft-com:vml" Requires="v">
-                <p:oleObj spid="_x0000_s11301" name="think-cell Folie" r:id="rId5" imgW="762" imgH="769" progId="TCLayout.ActiveDocument.1">
+                <p:oleObj spid="_x0000_s11307" name="think-cell Folie" r:id="rId5" imgW="762" imgH="769" progId="TCLayout.ActiveDocument.1">
                   <p:embed/>
                 </p:oleObj>
               </mc:Choice>
@@ -18637,7 +19380,7 @@
             <a:fld id="{7299ED31-B6BD-4CFC-8C77-58961B6150E5}" type="datetime1">
               <a:rPr lang="de-DE" smtClean="0"/>
               <a:pPr/>
-              <a:t>04.06.2018</a:t>
+              <a:t>09.06.2018</a:t>
             </a:fld>
             <a:endParaRPr lang="de-DE" dirty="0"/>
           </a:p>
@@ -18679,7 +19422,7 @@
           <a:blip r:embed="rId7">
             <a:extLst>
               <a:ext uri="{28A0092B-C50C-407E-A947-70E740481C1C}">
-                <a14:useLocalDpi xmlns:a14="http://schemas.microsoft.com/office/drawing/2010/main" val="0"/>
+                <a14:useLocalDpi xmlns:a14="http://schemas.microsoft.com/office/drawing/2010/main"/>
               </a:ext>
             </a:extLst>
           </a:blip>
@@ -18840,7 +19583,7 @@
             <a:fld id="{207F274F-E4AE-45D1-8462-735FF203E3CB}" type="datetime1">
               <a:rPr lang="de-DE" smtClean="0"/>
               <a:pPr/>
-              <a:t>04.06.2018</a:t>
+              <a:t>09.06.2018</a:t>
             </a:fld>
             <a:endParaRPr lang="de-DE" dirty="0"/>
           </a:p>
@@ -20867,7 +21610,7 @@
             <a:fld id="{207F274F-E4AE-45D1-8462-735FF203E3CB}" type="datetime1">
               <a:rPr lang="de-DE" smtClean="0"/>
               <a:pPr/>
-              <a:t>04.06.2018</a:t>
+              <a:t>09.06.2018</a:t>
             </a:fld>
             <a:endParaRPr lang="de-DE" dirty="0"/>
           </a:p>
@@ -23221,7 +23964,7 @@
             <a:fld id="{207F274F-E4AE-45D1-8462-735FF203E3CB}" type="datetime1">
               <a:rPr lang="de-DE" smtClean="0"/>
               <a:pPr/>
-              <a:t>04.06.2018</a:t>
+              <a:t>09.06.2018</a:t>
             </a:fld>
             <a:endParaRPr lang="de-DE" dirty="0"/>
           </a:p>
@@ -24622,7 +25365,7 @@
           <a:graphicData uri="http://schemas.openxmlformats.org/presentationml/2006/ole">
             <mc:AlternateContent xmlns:mc="http://schemas.openxmlformats.org/markup-compatibility/2006">
               <mc:Choice xmlns:v="urn:schemas-microsoft-com:vml" Requires="v">
-                <p:oleObj spid="_x0000_s15376" name="think-cell Folie" r:id="rId4" imgW="345" imgH="355" progId="TCLayout.ActiveDocument.1">
+                <p:oleObj spid="_x0000_s15382" name="think-cell Folie" r:id="rId4" imgW="345" imgH="355" progId="TCLayout.ActiveDocument.1">
                   <p:embed/>
                 </p:oleObj>
               </mc:Choice>
@@ -24830,7 +25573,7 @@
             <a:fld id="{207F274F-E4AE-45D1-8462-735FF203E3CB}" type="datetime1">
               <a:rPr lang="de-DE" smtClean="0"/>
               <a:pPr/>
-              <a:t>04.06.2018</a:t>
+              <a:t>09.06.2018</a:t>
             </a:fld>
             <a:endParaRPr lang="de-DE" dirty="0"/>
           </a:p>
@@ -25784,23 +26527,7 @@
                   <a:schemeClr val="tx1"/>
                 </a:solidFill>
               </a:rPr>
-              <a:t>Niedrige Latenzzeiten </a:t>
-            </a:r>
-            <a:r>
-              <a:rPr lang="de-DE" sz="1400" dirty="0" smtClean="0">
-                <a:solidFill>
-                  <a:schemeClr val="tx1"/>
-                </a:solidFill>
-              </a:rPr>
-              <a:t>(&lt; 10ms</a:t>
-            </a:r>
-            <a:r>
-              <a:rPr lang="de-DE" sz="1400" dirty="0" smtClean="0">
-                <a:solidFill>
-                  <a:schemeClr val="tx1"/>
-                </a:solidFill>
-              </a:rPr>
-              <a:t>)</a:t>
+              <a:t>Niedrige Latenzzeiten (&lt; 10ms)</a:t>
             </a:r>
           </a:p>
           <a:p>
@@ -26157,7 +26884,7 @@
             <a:fld id="{207F274F-E4AE-45D1-8462-735FF203E3CB}" type="datetime1">
               <a:rPr lang="de-DE" smtClean="0"/>
               <a:pPr/>
-              <a:t>04.06.2018</a:t>
+              <a:t>09.06.2018</a:t>
             </a:fld>
             <a:endParaRPr lang="de-DE" dirty="0"/>
           </a:p>

</xml_diff>